<commit_message>
pcb design updates. updated README. updated mid_term presentation.
</commit_message>
<xml_diff>
--- a/documentation/proposal.pptx
+++ b/documentation/proposal.pptx
@@ -270,7 +270,7 @@
           <a:bodyPr lIns="0" rIns="0" tIns="0" bIns="0" anchor="b"/>
           <a:p>
             <a:pPr algn="r"/>
-            <a:fld id="{BB90516F-8FCC-40DC-B346-27FAB2260849}" type="slidenum">
+            <a:fld id="{5EE064C6-9DA4-40CD-9346-E9C00DB5026E}" type="slidenum">
               <a:rPr b="0" lang="en-US" sz="1400" spc="-1" strike="noStrike">
                 <a:solidFill>
                   <a:srgbClr val="000000"/>
@@ -377,7 +377,7 @@
                 <a:spcPct val="100000"/>
               </a:lnSpc>
             </a:pPr>
-            <a:fld id="{8D100D02-E3C3-466D-97D1-4A9C5277B17E}" type="slidenum">
+            <a:fld id="{FF62E5CD-7E0D-4900-B56C-01F471A2F1BB}" type="slidenum">
               <a:rPr b="0" lang="en-US" sz="1300" spc="-1" strike="noStrike">
                 <a:solidFill>
                   <a:srgbClr val="ffffff"/>
@@ -8064,7 +8064,7 @@
                 <a:spcPct val="100000"/>
               </a:lnSpc>
             </a:pPr>
-            <a:fld id="{2CF215A3-8A28-447B-BD31-800A2934DBC4}" type="slidenum">
+            <a:fld id="{39B043B0-F404-4838-B407-C0CEBE564E60}" type="slidenum">
               <a:rPr b="0" lang="en-US" sz="1200" spc="-1" strike="noStrike">
                 <a:solidFill>
                   <a:srgbClr val="ffffff"/>
@@ -8516,7 +8516,7 @@
                 <a:spcPct val="100000"/>
               </a:lnSpc>
             </a:pPr>
-            <a:fld id="{61333E86-EB90-4BEE-8020-1A64513B3123}" type="slidenum">
+            <a:fld id="{544D49FE-B506-4399-8EC0-90ACB6B3597A}" type="slidenum">
               <a:rPr b="0" lang="en-US" sz="1200" spc="-1" strike="noStrike">
                 <a:solidFill>
                   <a:srgbClr val="ffffff"/>
@@ -9120,7 +9120,7 @@
                 <a:spcPct val="100000"/>
               </a:lnSpc>
             </a:pPr>
-            <a:fld id="{F3A065F1-69AD-4B93-B754-6D4E72E7B3F8}" type="slidenum">
+            <a:fld id="{46BE1B87-B542-403A-B96B-911393C537C0}" type="slidenum">
               <a:rPr b="0" lang="en-US" sz="1200" spc="-1" strike="noStrike">
                 <a:solidFill>
                   <a:srgbClr val="ffffff"/>
@@ -9610,7 +9610,7 @@
                 <a:spcPct val="100000"/>
               </a:lnSpc>
             </a:pPr>
-            <a:fld id="{9E008A8F-B0C0-44F0-B802-24BB309DADE4}" type="slidenum">
+            <a:fld id="{D82E11AE-2FFD-4129-B390-26A7BEA64004}" type="slidenum">
               <a:rPr b="0" lang="en-US" sz="1200" spc="-1" strike="noStrike">
                 <a:solidFill>
                   <a:srgbClr val="ffffff"/>
@@ -10077,7 +10077,7 @@
                 <a:spcPct val="100000"/>
               </a:lnSpc>
             </a:pPr>
-            <a:fld id="{72F35420-CD40-49B0-9D8F-15AE7FFF60E3}" type="slidenum">
+            <a:fld id="{8E7EC0B6-B7C9-43BE-BE8D-E0D9343A58A0}" type="slidenum">
               <a:rPr b="0" lang="en-US" sz="1200" spc="-1" strike="noStrike">
                 <a:solidFill>
                   <a:srgbClr val="ffffff"/>
@@ -10207,7 +10207,7 @@
               <a:buChar char=""/>
             </a:pPr>
             <a:r>
-              <a:rPr b="0" lang="en-US" sz="3200" spc="-1" strike="noStrike">
+              <a:rPr b="0" lang="en-US" sz="1600" spc="-1" strike="noStrike">
                 <a:solidFill>
                   <a:srgbClr val="ffffff"/>
                 </a:solidFill>
@@ -10245,7 +10245,7 @@
               <a:buChar char=""/>
             </a:pPr>
             <a:r>
-              <a:rPr b="0" lang="en-US" sz="3200" spc="-1" strike="noStrike">
+              <a:rPr b="0" lang="en-US" sz="1600" spc="-1" strike="noStrike">
                 <a:solidFill>
                   <a:srgbClr val="ffffff"/>
                 </a:solidFill>
@@ -10283,7 +10283,7 @@
               <a:buChar char=""/>
             </a:pPr>
             <a:r>
-              <a:rPr b="0" lang="en-US" sz="3200" spc="-1" strike="noStrike">
+              <a:rPr b="0" lang="en-US" sz="1600" spc="-1" strike="noStrike">
                 <a:solidFill>
                   <a:srgbClr val="ffffff"/>
                 </a:solidFill>
@@ -10321,45 +10321,7 @@
               <a:buChar char=""/>
             </a:pPr>
             <a:r>
-              <a:rPr b="0" lang="en-US" sz="3200" spc="-1" strike="noStrike">
-                <a:solidFill>
-                  <a:srgbClr val="ffffff"/>
-                </a:solidFill>
-                <a:uFill>
-                  <a:solidFill>
-                    <a:srgbClr val="ffffff"/>
-                  </a:solidFill>
-                </a:uFill>
-                <a:latin typeface="Garamond"/>
-              </a:rPr>
-              <a:t> </a:t>
-            </a:r>
-            <a:endParaRPr b="0" lang="en-US" sz="1800" spc="-1" strike="noStrike">
-              <a:solidFill>
-                <a:srgbClr val="ffffff"/>
-              </a:solidFill>
-              <a:uFill>
-                <a:solidFill>
-                  <a:srgbClr val="ffffff"/>
-                </a:solidFill>
-              </a:uFill>
-              <a:latin typeface="Arial"/>
-            </a:endParaRPr>
-          </a:p>
-          <a:p>
-            <a:pPr marL="342720" indent="-342360">
-              <a:lnSpc>
-                <a:spcPct val="100000"/>
-              </a:lnSpc>
-              <a:buClr>
-                <a:srgbClr val="ffcc00"/>
-              </a:buClr>
-              <a:buSzPct val="70000"/>
-              <a:buFont typeface="Wingdings" charset="2"/>
-              <a:buChar char=""/>
-            </a:pPr>
-            <a:r>
-              <a:rPr b="0" lang="en-US" sz="3200" spc="-1" strike="noStrike">
+              <a:rPr b="0" lang="en-US" sz="1600" spc="-1" strike="noStrike">
                 <a:solidFill>
                   <a:srgbClr val="ffffff"/>
                 </a:solidFill>
@@ -10657,7 +10619,7 @@
                 <a:spcPct val="100000"/>
               </a:lnSpc>
             </a:pPr>
-            <a:fld id="{65FCC82C-F1EA-45D6-B636-593442F4D071}" type="slidenum">
+            <a:fld id="{9E2F8F4C-9E84-417E-8EBF-E09F6DEBA1C5}" type="slidenum">
               <a:rPr b="0" lang="en-US" sz="1200" spc="-1" strike="noStrike">
                 <a:solidFill>
                   <a:srgbClr val="ffffff"/>
@@ -11199,7 +11161,7 @@
                 <a:spcPct val="100000"/>
               </a:lnSpc>
             </a:pPr>
-            <a:fld id="{E465BFF7-3A82-4A5A-A697-811FC754F20F}" type="slidenum">
+            <a:fld id="{B5008479-BE86-44E1-B900-6C4FD6CFD7F7}" type="slidenum">
               <a:rPr b="0" lang="en-US" sz="1200" spc="-1" strike="noStrike">
                 <a:solidFill>
                   <a:srgbClr val="ffffff"/>
@@ -11765,7 +11727,7 @@
                 <a:spcPct val="100000"/>
               </a:lnSpc>
             </a:pPr>
-            <a:fld id="{A9D0E768-8BCA-4054-980A-20DC660431B4}" type="slidenum">
+            <a:fld id="{32E0CDE0-0B97-46F1-AE1E-9301386FC0E3}" type="slidenum">
               <a:rPr b="0" lang="en-US" sz="1200" spc="-1" strike="noStrike">
                 <a:solidFill>
                   <a:srgbClr val="ffffff"/>
@@ -11960,7 +11922,7 @@
                 <a:spcPct val="100000"/>
               </a:lnSpc>
             </a:pPr>
-            <a:fld id="{3C6420FC-86FB-4D87-B31C-B1CE45257383}" type="slidenum">
+            <a:fld id="{3CD0AAFB-D387-4C40-9145-E42443128E49}" type="slidenum">
               <a:rPr b="0" lang="en-US" sz="1200" spc="-1" strike="noStrike">
                 <a:solidFill>
                   <a:srgbClr val="ffffff"/>
@@ -12117,7 +12079,7 @@
                 <a:spcPct val="100000"/>
               </a:lnSpc>
             </a:pPr>
-            <a:fld id="{3416AB89-8DA9-4A85-BDC3-0252081F77FF}" type="slidenum">
+            <a:fld id="{B3ECBF23-C62D-4986-B591-A8F02E90B698}" type="slidenum">
               <a:rPr b="0" lang="en-US" sz="1200" spc="-1" strike="noStrike">
                 <a:solidFill>
                   <a:srgbClr val="ffffff"/>
@@ -12607,7 +12569,7 @@
                 <a:spcPct val="100000"/>
               </a:lnSpc>
             </a:pPr>
-            <a:fld id="{FDF0BE90-54EE-401B-BB1D-4C5B38E06FCE}" type="slidenum">
+            <a:fld id="{27F3A6FE-6E0B-4CDF-9DBE-9656F19A5DA7}" type="slidenum">
               <a:rPr b="0" lang="en-US" sz="1200" spc="-1" strike="noStrike">
                 <a:solidFill>
                   <a:srgbClr val="ffffff"/>
@@ -13020,7 +12982,7 @@
                 <a:spcPct val="100000"/>
               </a:lnSpc>
             </a:pPr>
-            <a:fld id="{FB769F90-E89B-4A1E-BF68-BF987BE4C739}" type="slidenum">
+            <a:fld id="{4EFDC523-EFF3-4207-ABCE-146F0813521B}" type="slidenum">
               <a:rPr b="0" lang="en-US" sz="1200" spc="-1" strike="noStrike">
                 <a:solidFill>
                   <a:srgbClr val="ffffff"/>
@@ -13404,7 +13366,7 @@
                 <a:spcPct val="100000"/>
               </a:lnSpc>
             </a:pPr>
-            <a:fld id="{38A33D3B-4A65-4C28-8B93-85952D7D9792}" type="slidenum">
+            <a:fld id="{9396EF44-E3D9-45B1-B129-2B40CF446B44}" type="slidenum">
               <a:rPr b="0" lang="en-US" sz="1200" spc="-1" strike="noStrike">
                 <a:solidFill>
                   <a:srgbClr val="ffffff"/>

</xml_diff>